<commit_message>
a minor change in ppt & dsa question
According to asked questions, we will make our ppt, we will include as less unnecessary content as possible and to the point info.
</commit_message>
<xml_diff>
--- a/double_hash_and_shell_sort.pptx
+++ b/double_hash_and_shell_sort.pptx
@@ -8,6 +8,7 @@
   <p:sldIdLst>
     <p:sldId id="256" r:id="rId3"/>
     <p:sldId id="257" r:id="rId4"/>
+    <p:sldId id="258" r:id="rId5"/>
   </p:sldIdLst>
   <p:sldSz cx="12192000" cy="6858000"/>
   <p:notesSz cx="6858000" cy="9144000"/>
@@ -106,6 +107,11 @@
       </a:defRPr>
     </a:lvl9pPr>
   </p:defaultTextStyle>
+  <p:extLst>
+    <p:ext uri="{EFAFB233-063F-42B5-8137-9DF3F51BA10A}">
+      <p15:sldGuideLst xmlns:p15="http://schemas.microsoft.com/office/powerpoint/2012/main"/>
+    </p:ext>
+  </p:extLst>
 </p:presentation>
 </file>
 
@@ -1014,6 +1020,13 @@
         </dgm:presLayoutVars>
       </dgm:prSet>
       <dgm:spPr/>
+      <dgm:t>
+        <a:bodyPr/>
+        <a:lstStyle/>
+        <a:p>
+          <a:endParaRPr lang="en-US"/>
+        </a:p>
+      </dgm:t>
     </dgm:pt>
     <dgm:pt modelId="{A1CA2F44-6C9B-47D8-AF5D-28AF49AD9589}" type="pres">
       <dgm:prSet presAssocID="{9C38F951-CEA1-46D7-891C-21A68A0540FA}" presName="parTxOnlySpace" presStyleCnt="0"/>
@@ -2874,7 +2887,7 @@
           <a:p>
             <a:fld id="{1DF7BC8C-8114-4E4D-AC42-AF2B48A295E9}" type="datetimeFigureOut">
               <a:rPr lang="en-US" smtClean="0"/>
-              <a:t>19|7|1</a:t>
+              <a:t>19|7|3</a:t>
             </a:fld>
             <a:endParaRPr lang="en-US"/>
           </a:p>
@@ -3066,7 +3079,7 @@
           <a:p>
             <a:fld id="{1DF7BC8C-8114-4E4D-AC42-AF2B48A295E9}" type="datetimeFigureOut">
               <a:rPr lang="en-US" smtClean="0"/>
-              <a:t>19|7|1</a:t>
+              <a:t>19|7|3</a:t>
             </a:fld>
             <a:endParaRPr lang="en-US"/>
           </a:p>
@@ -5075,7 +5088,7 @@
           <a:p>
             <a:fld id="{1DF7BC8C-8114-4E4D-AC42-AF2B48A295E9}" type="datetimeFigureOut">
               <a:rPr lang="en-US" smtClean="0"/>
-              <a:t>19|7|1</a:t>
+              <a:t>19|7|3</a:t>
             </a:fld>
             <a:endParaRPr lang="en-US"/>
           </a:p>
@@ -5913,7 +5926,7 @@
           <a:p>
             <a:fld id="{1DF7BC8C-8114-4E4D-AC42-AF2B48A295E9}" type="datetimeFigureOut">
               <a:rPr lang="en-US" smtClean="0"/>
-              <a:t>19|7|1</a:t>
+              <a:t>19|7|3</a:t>
             </a:fld>
             <a:endParaRPr lang="en-US"/>
           </a:p>
@@ -6213,7 +6226,7 @@
           <a:p>
             <a:fld id="{1DF7BC8C-8114-4E4D-AC42-AF2B48A295E9}" type="datetimeFigureOut">
               <a:rPr lang="en-US" smtClean="0"/>
-              <a:t>19|7|1</a:t>
+              <a:t>19|7|3</a:t>
             </a:fld>
             <a:endParaRPr lang="en-US"/>
           </a:p>
@@ -6652,7 +6665,7 @@
           <a:p>
             <a:fld id="{1DF7BC8C-8114-4E4D-AC42-AF2B48A295E9}" type="datetimeFigureOut">
               <a:rPr lang="en-US" smtClean="0"/>
-              <a:t>19|7|1</a:t>
+              <a:t>19|7|3</a:t>
             </a:fld>
             <a:endParaRPr lang="en-US"/>
           </a:p>
@@ -6782,7 +6795,7 @@
           <a:p>
             <a:fld id="{1DF7BC8C-8114-4E4D-AC42-AF2B48A295E9}" type="datetimeFigureOut">
               <a:rPr lang="en-US" smtClean="0"/>
-              <a:t>19|7|1</a:t>
+              <a:t>19|7|3</a:t>
             </a:fld>
             <a:endParaRPr lang="en-US"/>
           </a:p>
@@ -6889,7 +6902,7 @@
           <a:p>
             <a:fld id="{1DF7BC8C-8114-4E4D-AC42-AF2B48A295E9}" type="datetimeFigureOut">
               <a:rPr lang="en-US" smtClean="0"/>
-              <a:t>19|7|1</a:t>
+              <a:t>19|7|3</a:t>
             </a:fld>
             <a:endParaRPr lang="en-US"/>
           </a:p>
@@ -7178,7 +7191,7 @@
           <a:p>
             <a:fld id="{1DF7BC8C-8114-4E4D-AC42-AF2B48A295E9}" type="datetimeFigureOut">
               <a:rPr lang="en-US" smtClean="0"/>
-              <a:t>19|7|1</a:t>
+              <a:t>19|7|3</a:t>
             </a:fld>
             <a:endParaRPr lang="en-US"/>
           </a:p>
@@ -7447,7 +7460,7 @@
           <a:p>
             <a:fld id="{1DF7BC8C-8114-4E4D-AC42-AF2B48A295E9}" type="datetimeFigureOut">
               <a:rPr lang="en-US" smtClean="0"/>
-              <a:t>19|7|1</a:t>
+              <a:t>19|7|3</a:t>
             </a:fld>
             <a:endParaRPr lang="en-US"/>
           </a:p>
@@ -7782,7 +7795,7 @@
           <a:p>
             <a:fld id="{1DF7BC8C-8114-4E4D-AC42-AF2B48A295E9}" type="datetimeFigureOut">
               <a:rPr lang="en-US" smtClean="0"/>
-              <a:t>19|7|1</a:t>
+              <a:t>19|7|3</a:t>
             </a:fld>
             <a:endParaRPr lang="en-US"/>
           </a:p>
@@ -9185,7 +9198,15 @@
           <a:p>
             <a:r>
               <a:rPr lang="en-US" dirty="0" smtClean="0"/>
-              <a:t>Double Hashing &amp; Shell Short</a:t>
+              <a:t>Double Hashing &amp; </a:t>
+            </a:r>
+            <a:r>
+              <a:rPr lang="en-US" smtClean="0"/>
+              <a:t>Shell </a:t>
+            </a:r>
+            <a:r>
+              <a:rPr lang="en-US" smtClean="0"/>
+              <a:t>Sort</a:t>
             </a:r>
             <a:endParaRPr lang="en-US" dirty="0"/>
           </a:p>
@@ -9431,17 +9452,6 @@
                 </a:rPr>
                 <a:t>Collision</a:t>
               </a:r>
-              <a:endParaRPr kumimoji="0" lang="en-US" sz="3600" b="0" i="0" u="none" strike="noStrike" cap="none" normalizeH="0" baseline="0" dirty="0" smtClean="0">
-                <a:ln>
-                  <a:noFill/>
-                </a:ln>
-                <a:solidFill>
-                  <a:schemeClr val="bg1"/>
-                </a:solidFill>
-                <a:effectLst/>
-                <a:latin typeface="Futura LT Book" pitchFamily="2" charset="0"/>
-                <a:ea typeface="굴림" pitchFamily="34" charset="-127"/>
-              </a:endParaRPr>
             </a:p>
           </p:txBody>
         </p:sp>
@@ -9472,6 +9482,74 @@
     <p:extLst>
       <p:ext uri="{BB962C8B-B14F-4D97-AF65-F5344CB8AC3E}">
         <p14:creationId xmlns:p14="http://schemas.microsoft.com/office/powerpoint/2010/main" val="2400559856"/>
+      </p:ext>
+    </p:extLst>
+  </p:cSld>
+  <p:clrMapOvr>
+    <a:masterClrMapping/>
+  </p:clrMapOvr>
+</p:sld>
+</file>
+
+<file path=ppt/slides/slide3.xml><?xml version="1.0" encoding="utf-8"?>
+<p:sld xmlns:a="http://schemas.openxmlformats.org/drawingml/2006/main" xmlns:r="http://schemas.openxmlformats.org/officeDocument/2006/relationships" xmlns:p="http://schemas.openxmlformats.org/presentationml/2006/main">
+  <p:cSld>
+    <p:spTree>
+      <p:nvGrpSpPr>
+        <p:cNvPr id="1" name=""/>
+        <p:cNvGrpSpPr/>
+        <p:nvPr/>
+      </p:nvGrpSpPr>
+      <p:grpSpPr>
+        <a:xfrm>
+          <a:off x="0" y="0"/>
+          <a:ext cx="0" cy="0"/>
+          <a:chOff x="0" y="0"/>
+          <a:chExt cx="0" cy="0"/>
+        </a:xfrm>
+      </p:grpSpPr>
+      <p:sp>
+        <p:nvSpPr>
+          <p:cNvPr id="2" name="Title 1"/>
+          <p:cNvSpPr>
+            <a:spLocks noGrp="1"/>
+          </p:cNvSpPr>
+          <p:nvPr>
+            <p:ph type="title"/>
+          </p:nvPr>
+        </p:nvSpPr>
+        <p:spPr/>
+        <p:txBody>
+          <a:bodyPr/>
+          <a:lstStyle/>
+          <a:p>
+            <a:endParaRPr lang="en-US" dirty="0"/>
+          </a:p>
+        </p:txBody>
+      </p:sp>
+      <p:sp>
+        <p:nvSpPr>
+          <p:cNvPr id="3" name="Content Placeholder 2"/>
+          <p:cNvSpPr>
+            <a:spLocks noGrp="1"/>
+          </p:cNvSpPr>
+          <p:nvPr>
+            <p:ph idx="1"/>
+          </p:nvPr>
+        </p:nvSpPr>
+        <p:spPr/>
+        <p:txBody>
+          <a:bodyPr/>
+          <a:lstStyle/>
+          <a:p>
+            <a:endParaRPr lang="en-US"/>
+          </a:p>
+        </p:txBody>
+      </p:sp>
+    </p:spTree>
+    <p:extLst>
+      <p:ext uri="{BB962C8B-B14F-4D97-AF65-F5344CB8AC3E}">
+        <p14:creationId xmlns:p14="http://schemas.microsoft.com/office/powerpoint/2010/main" val="2104727954"/>
       </p:ext>
     </p:extLst>
   </p:cSld>

</xml_diff>